<commit_message>
Updated express & db presentation.
</commit_message>
<xml_diff>
--- a/Presentations for Visual Studio Code MVA/03.Express-and-databases.pptx
+++ b/Presentations for Visual Studio Code MVA/03.Express-and-databases.pptx
@@ -3887,11 +3887,7 @@
             <a:pPr marL="914400" indent="-914400"/>
             <a:r>
               <a:rPr lang="en-US" dirty="0" smtClean="0"/>
-              <a:t>03 | </a:t>
-            </a:r>
-            <a:r>
-              <a:rPr lang="en-US" dirty="0" smtClean="0"/>
-              <a:t>Express and Databases</a:t>
+              <a:t>03 | Express and Databases</a:t>
             </a:r>
             <a:endParaRPr lang="en-US" dirty="0"/>
           </a:p>
@@ -4008,7 +4004,7 @@
           <a:noFill/>
           <a:extLst>
             <a:ext uri="{909E8E84-426E-40dd-AFC4-6F175D3DCCD1}">
-              <a14:hiddenFill xmlns:a14="http://schemas.microsoft.com/office/drawing/2010/main" xmlns="">
+              <a14:hiddenFill xmlns="" xmlns:a14="http://schemas.microsoft.com/office/drawing/2010/main">
                 <a:solidFill>
                   <a:srgbClr val="FFFFFF"/>
                 </a:solidFill>
@@ -4356,15 +4352,7 @@
           <a:p>
             <a:r>
               <a:rPr lang="en-US" dirty="0" smtClean="0"/>
-              <a:t>Its a lot like a </a:t>
-            </a:r>
-            <a:r>
-              <a:rPr lang="en-US" dirty="0" smtClean="0"/>
-              <a:t>JavaScript </a:t>
-            </a:r>
-            <a:r>
-              <a:rPr lang="en-US" dirty="0" smtClean="0"/>
-              <a:t>interactive shell</a:t>
+              <a:t>Its a lot like a JavaScript interactive shell</a:t>
             </a:r>
             <a:endParaRPr lang="en-US" dirty="0"/>
           </a:p>
@@ -4893,11 +4881,6 @@
               </a:rPr>
               <a:t>DEMO</a:t>
             </a:r>
-            <a:endParaRPr lang="en-US" sz="4400" dirty="0" smtClean="0">
-              <a:solidFill>
-                <a:schemeClr val="bg1"/>
-              </a:solidFill>
-            </a:endParaRPr>
           </a:p>
         </p:txBody>
       </p:sp>
@@ -4991,11 +4974,6 @@
               </a:rPr>
               <a:t>DEMO</a:t>
             </a:r>
-            <a:endParaRPr lang="en-US" sz="4400" dirty="0" smtClean="0">
-              <a:solidFill>
-                <a:schemeClr val="bg1"/>
-              </a:solidFill>
-            </a:endParaRPr>
           </a:p>
         </p:txBody>
       </p:sp>
@@ -5096,35 +5074,13 @@
           </a:p>
           <a:p>
             <a:r>
+              <a:rPr lang="en-GB" smtClean="0"/>
+              <a:t>Show </a:t>
+            </a:r>
+            <a:r>
               <a:rPr lang="en-GB" dirty="0" smtClean="0"/>
-              <a:t>Discuss </a:t>
-            </a:r>
-            <a:r>
-              <a:rPr lang="en-GB" dirty="0" err="1" smtClean="0"/>
-              <a:t>Redis</a:t>
-            </a:r>
-            <a:endParaRPr lang="en-GB" dirty="0" smtClean="0"/>
-          </a:p>
-          <a:p>
-            <a:r>
-              <a:rPr lang="en-GB" dirty="0" smtClean="0"/>
-              <a:t>Show you how to connect to Azure </a:t>
-            </a:r>
-            <a:r>
-              <a:rPr lang="en-GB" dirty="0" err="1" smtClean="0"/>
-              <a:t>Redis</a:t>
-            </a:r>
-            <a:r>
-              <a:rPr lang="en-GB" dirty="0" smtClean="0"/>
-              <a:t> Cache</a:t>
-            </a:r>
-          </a:p>
-          <a:p>
-            <a:r>
-              <a:rPr lang="en-GB" dirty="0" smtClean="0"/>
-              <a:t>Show you how to save to MongoDB using Mongoose</a:t>
-            </a:r>
-            <a:endParaRPr lang="en-GB" dirty="0" smtClean="0"/>
+              <a:t>you how to save to MongoDB using Mongoose</a:t>
+            </a:r>
           </a:p>
         </p:txBody>
       </p:sp>
@@ -5218,11 +5174,6 @@
               </a:rPr>
               <a:t>DEMO</a:t>
             </a:r>
-            <a:endParaRPr lang="en-US" sz="4400" dirty="0" smtClean="0">
-              <a:solidFill>
-                <a:schemeClr val="bg1"/>
-              </a:solidFill>
-            </a:endParaRPr>
           </a:p>
         </p:txBody>
       </p:sp>
@@ -6037,11 +5988,11 @@
   <p:clrMapOvr>
     <a:masterClrMapping/>
   </p:clrMapOvr>
-  <mc:AlternateContent xmlns:mc="http://schemas.openxmlformats.org/markup-compatibility/2006">
-    <mc:Choice xmlns:p14="http://schemas.microsoft.com/office/powerpoint/2010/main" Requires="p14">
+  <mc:AlternateContent xmlns:mc="http://schemas.openxmlformats.org/markup-compatibility/2006" xmlns:p14="http://schemas.microsoft.com/office/powerpoint/2010/main">
+    <mc:Choice Requires="p14">
       <p:transition spd="slow" p14:dur="2000"/>
     </mc:Choice>
-    <mc:Fallback>
+    <mc:Fallback xmlns="">
       <p:transition spd="slow"/>
     </mc:Fallback>
   </mc:AlternateContent>
@@ -7102,6 +7053,21 @@
 </file>
 
 <file path=customXml/item1.xml><?xml version="1.0" encoding="utf-8"?>
+<p:properties xmlns:p="http://schemas.microsoft.com/office/2006/metadata/properties" xmlns:xsi="http://www.w3.org/2001/XMLSchema-instance" xmlns:pc="http://schemas.microsoft.com/office/infopath/2007/PartnerControls">
+  <documentManagement/>
+</p:properties>
+</file>
+
+<file path=customXml/item2.xml><?xml version="1.0" encoding="utf-8"?>
+<?mso-contentType ?>
+<FormTemplates xmlns="http://schemas.microsoft.com/sharepoint/v3/contenttype/forms">
+  <Display>DocumentLibraryForm</Display>
+  <Edit>DocumentLibraryForm</Edit>
+  <New>DocumentLibraryForm</New>
+</FormTemplates>
+</file>
+
+<file path=customXml/item3.xml><?xml version="1.0" encoding="utf-8"?>
 <ct:contentTypeSchema xmlns:ct="http://schemas.microsoft.com/office/2006/metadata/contentType" xmlns:ma="http://schemas.microsoft.com/office/2006/metadata/properties/metaAttributes" ct:_="" ma:_="" ma:contentTypeName="Document" ma:contentTypeID="0x010100391E57C78B9F604FB8BAD296D1460E2A" ma:contentTypeVersion="1" ma:contentTypeDescription="Create a new document." ma:contentTypeScope="" ma:versionID="fb382fe2362acd2155f454904f478e4d">
   <xsd:schema xmlns:xsd="http://www.w3.org/2001/XMLSchema" xmlns:xs="http://www.w3.org/2001/XMLSchema" xmlns:p="http://schemas.microsoft.com/office/2006/metadata/properties" xmlns:ns3="636b0322-90fb-440c-9cbc-22749e7231e9" targetNamespace="http://schemas.microsoft.com/office/2006/metadata/properties" ma:root="true" ma:fieldsID="b9887c63ce4710c1aeb75a5f03aecb69" ns3:_="">
     <xsd:import namespace="636b0322-90fb-440c-9cbc-22749e7231e9"/>
@@ -7241,22 +7207,31 @@
 </ct:contentTypeSchema>
 </file>
 
-<file path=customXml/item2.xml><?xml version="1.0" encoding="utf-8"?>
-<?mso-contentType ?>
-<FormTemplates xmlns="http://schemas.microsoft.com/sharepoint/v3/contenttype/forms">
-  <Display>DocumentLibraryForm</Display>
-  <Edit>DocumentLibraryForm</Edit>
-  <New>DocumentLibraryForm</New>
-</FormTemplates>
+<file path=customXml/itemProps1.xml><?xml version="1.0" encoding="utf-8"?>
+<ds:datastoreItem xmlns:ds="http://schemas.openxmlformats.org/officeDocument/2006/customXml" ds:itemID="{7025FDD9-4C58-4084-9F89-0E6ADD6FFF55}">
+  <ds:schemaRefs>
+    <ds:schemaRef ds:uri="http://purl.org/dc/terms/"/>
+    <ds:schemaRef ds:uri="http://schemas.openxmlformats.org/package/2006/metadata/core-properties"/>
+    <ds:schemaRef ds:uri="http://schemas.microsoft.com/office/2006/documentManagement/types"/>
+    <ds:schemaRef ds:uri="http://schemas.microsoft.com/office/infopath/2007/PartnerControls"/>
+    <ds:schemaRef ds:uri="http://purl.org/dc/elements/1.1/"/>
+    <ds:schemaRef ds:uri="http://schemas.microsoft.com/office/2006/metadata/properties"/>
+    <ds:schemaRef ds:uri="636b0322-90fb-440c-9cbc-22749e7231e9"/>
+    <ds:schemaRef ds:uri="http://www.w3.org/XML/1998/namespace"/>
+    <ds:schemaRef ds:uri="http://purl.org/dc/dcmitype/"/>
+  </ds:schemaRefs>
+</ds:datastoreItem>
 </file>
 
-<file path=customXml/item3.xml><?xml version="1.0" encoding="utf-8"?>
-<p:properties xmlns:p="http://schemas.microsoft.com/office/2006/metadata/properties" xmlns:xsi="http://www.w3.org/2001/XMLSchema-instance" xmlns:pc="http://schemas.microsoft.com/office/infopath/2007/PartnerControls">
-  <documentManagement/>
-</p:properties>
+<file path=customXml/itemProps2.xml><?xml version="1.0" encoding="utf-8"?>
+<ds:datastoreItem xmlns:ds="http://schemas.openxmlformats.org/officeDocument/2006/customXml" ds:itemID="{B0CA13EC-1D3C-4D6F-8D1C-E8A452CFC79A}">
+  <ds:schemaRefs>
+    <ds:schemaRef ds:uri="http://schemas.microsoft.com/sharepoint/v3/contenttype/forms"/>
+  </ds:schemaRefs>
+</ds:datastoreItem>
 </file>
 
-<file path=customXml/itemProps1.xml><?xml version="1.0" encoding="utf-8"?>
+<file path=customXml/itemProps3.xml><?xml version="1.0" encoding="utf-8"?>
 <ds:datastoreItem xmlns:ds="http://schemas.openxmlformats.org/officeDocument/2006/customXml" ds:itemID="{7B70CE0C-0988-423A-BF66-B40F6A1061FF}">
   <ds:schemaRefs>
     <ds:schemaRef ds:uri="http://schemas.microsoft.com/office/2006/metadata/contentType"/>
@@ -7272,28 +7247,4 @@
     <ds:schemaRef ds:uri="http://schemas.microsoft.com/internal/obd"/>
   </ds:schemaRefs>
 </ds:datastoreItem>
-</file>
-
-<file path=customXml/itemProps2.xml><?xml version="1.0" encoding="utf-8"?>
-<ds:datastoreItem xmlns:ds="http://schemas.openxmlformats.org/officeDocument/2006/customXml" ds:itemID="{B0CA13EC-1D3C-4D6F-8D1C-E8A452CFC79A}">
-  <ds:schemaRefs>
-    <ds:schemaRef ds:uri="http://schemas.microsoft.com/sharepoint/v3/contenttype/forms"/>
-  </ds:schemaRefs>
-</ds:datastoreItem>
-</file>
-
-<file path=customXml/itemProps3.xml><?xml version="1.0" encoding="utf-8"?>
-<ds:datastoreItem xmlns:ds="http://schemas.openxmlformats.org/officeDocument/2006/customXml" ds:itemID="{7025FDD9-4C58-4084-9F89-0E6ADD6FFF55}">
-  <ds:schemaRefs>
-    <ds:schemaRef ds:uri="http://purl.org/dc/terms/"/>
-    <ds:schemaRef ds:uri="http://schemas.openxmlformats.org/package/2006/metadata/core-properties"/>
-    <ds:schemaRef ds:uri="http://schemas.microsoft.com/office/2006/documentManagement/types"/>
-    <ds:schemaRef ds:uri="http://schemas.microsoft.com/office/infopath/2007/PartnerControls"/>
-    <ds:schemaRef ds:uri="http://purl.org/dc/elements/1.1/"/>
-    <ds:schemaRef ds:uri="http://schemas.microsoft.com/office/2006/metadata/properties"/>
-    <ds:schemaRef ds:uri="636b0322-90fb-440c-9cbc-22749e7231e9"/>
-    <ds:schemaRef ds:uri="http://www.w3.org/XML/1998/namespace"/>
-    <ds:schemaRef ds:uri="http://purl.org/dc/dcmitype/"/>
-  </ds:schemaRefs>
-</ds:datastoreItem>
 </file>
</xml_diff>

<commit_message>
Updated express and db presentation.
</commit_message>
<xml_diff>
--- a/Presentations for Visual Studio Code MVA/03.Express-and-databases.pptx
+++ b/Presentations for Visual Studio Code MVA/03.Express-and-databases.pptx
@@ -5,10 +5,10 @@
     <p:sldMasterId id="2147483660" r:id="rId4"/>
   </p:sldMasterIdLst>
   <p:notesMasterIdLst>
-    <p:notesMasterId r:id="rId25"/>
+    <p:notesMasterId r:id="rId24"/>
   </p:notesMasterIdLst>
   <p:handoutMasterIdLst>
-    <p:handoutMasterId r:id="rId26"/>
+    <p:handoutMasterId r:id="rId25"/>
   </p:handoutMasterIdLst>
   <p:sldIdLst>
     <p:sldId id="283" r:id="rId5"/>
@@ -29,8 +29,7 @@
     <p:sldId id="316" r:id="rId20"/>
     <p:sldId id="317" r:id="rId21"/>
     <p:sldId id="318" r:id="rId22"/>
-    <p:sldId id="319" r:id="rId23"/>
-    <p:sldId id="289" r:id="rId24"/>
+    <p:sldId id="289" r:id="rId23"/>
   </p:sldIdLst>
   <p:sldSz cx="12192000" cy="6858000"/>
   <p:notesSz cx="6858000" cy="9144000"/>
@@ -4027,13 +4026,8 @@
           <a:p>
             <a:r>
               <a:rPr lang="en-US" dirty="0" smtClean="0"/>
-              <a:t>Load bulk data from CSV or JSON </a:t>
-            </a:r>
-            <a:r>
-              <a:rPr lang="en-US" dirty="0" smtClean="0"/>
-              <a:t>files</a:t>
-            </a:r>
-            <a:endParaRPr lang="en-US" dirty="0" smtClean="0"/>
+              <a:t>Load bulk data from CSV or JSON files</a:t>
+            </a:r>
           </a:p>
           <a:p>
             <a:r>
@@ -4218,13 +4212,8 @@
           <a:p>
             <a:r>
               <a:rPr lang="en-US" dirty="0" smtClean="0"/>
-              <a:t>Test out new </a:t>
-            </a:r>
-            <a:r>
-              <a:rPr lang="en-US" dirty="0" smtClean="0"/>
-              <a:t>queries</a:t>
-            </a:r>
-            <a:endParaRPr lang="en-US" dirty="0" smtClean="0"/>
+              <a:t>Test out new queries</a:t>
+            </a:r>
           </a:p>
           <a:p>
             <a:r>
@@ -4331,16 +4320,11 @@
               <a:rPr lang="en-US" dirty="0" smtClean="0"/>
               <a:t>Documents</a:t>
             </a:r>
-            <a:endParaRPr lang="en-US" dirty="0" smtClean="0"/>
-          </a:p>
-          <a:p>
-            <a:r>
-              <a:rPr lang="en-US" dirty="0" smtClean="0"/>
-              <a:t>Databases contain many of </a:t>
-            </a:r>
-            <a:r>
-              <a:rPr lang="en-US" dirty="0" smtClean="0"/>
-              <a:t>these</a:t>
+          </a:p>
+          <a:p>
+            <a:r>
+              <a:rPr lang="en-US" dirty="0" smtClean="0"/>
+              <a:t>Databases contain many of these</a:t>
             </a:r>
             <a:endParaRPr lang="en-US" dirty="0"/>
           </a:p>
@@ -4429,24 +4413,15 @@
           <a:p>
             <a:r>
               <a:rPr lang="en-US" dirty="0" smtClean="0"/>
-              <a:t>Use a Query Object to Fetch Requested </a:t>
-            </a:r>
-            <a:r>
-              <a:rPr lang="en-US" dirty="0" smtClean="0"/>
-              <a:t>Data</a:t>
+              <a:t>Use a Query Object to Fetch Requested Data</a:t>
             </a:r>
             <a:endParaRPr lang="en-US" dirty="0"/>
           </a:p>
           <a:p>
             <a:r>
               <a:rPr lang="en-US" dirty="0" smtClean="0"/>
-              <a:t>Resembles objects already in the </a:t>
-            </a:r>
-            <a:r>
-              <a:rPr lang="en-US" dirty="0" smtClean="0"/>
-              <a:t>database</a:t>
-            </a:r>
-            <a:endParaRPr lang="en-US" dirty="0" smtClean="0"/>
+              <a:t>Resembles objects already in the database</a:t>
+            </a:r>
           </a:p>
           <a:p>
             <a:r>
@@ -4533,24 +4508,14 @@
           <a:p>
             <a:r>
               <a:rPr lang="en-US" dirty="0" smtClean="0"/>
-              <a:t>Used to filter the data you </a:t>
-            </a:r>
-            <a:r>
-              <a:rPr lang="en-US" dirty="0" smtClean="0"/>
-              <a:t>want</a:t>
-            </a:r>
-            <a:endParaRPr lang="en-US" dirty="0" smtClean="0"/>
-          </a:p>
-          <a:p>
-            <a:r>
-              <a:rPr lang="en-US" dirty="0" smtClean="0"/>
-              <a:t>Similar to what SELECT does in a SQL </a:t>
-            </a:r>
-            <a:r>
-              <a:rPr lang="en-US" dirty="0" smtClean="0"/>
-              <a:t>Query</a:t>
-            </a:r>
-            <a:endParaRPr lang="en-US" dirty="0" smtClean="0"/>
+              <a:t>Used to filter the data you want</a:t>
+            </a:r>
+          </a:p>
+          <a:p>
+            <a:r>
+              <a:rPr lang="en-US" dirty="0" smtClean="0"/>
+              <a:t>Similar to what SELECT does in a SQL Query</a:t>
+            </a:r>
           </a:p>
           <a:p>
             <a:r>
@@ -4650,7 +4615,6 @@
               <a:rPr lang="en-US" dirty="0" smtClean="0"/>
               <a:t>Add MongoDB to your Node Project</a:t>
             </a:r>
-            <a:endParaRPr lang="en-US" dirty="0" smtClean="0"/>
           </a:p>
         </p:txBody>
       </p:sp>
@@ -4892,33 +4856,10 @@
           <a:chExt cx="0" cy="0"/>
         </a:xfrm>
       </p:grpSpPr>
-      <p:sp>
-        <p:nvSpPr>
-          <p:cNvPr id="2" name="Title 1"/>
-          <p:cNvSpPr>
-            <a:spLocks noGrp="1"/>
-          </p:cNvSpPr>
-          <p:nvPr>
-            <p:ph type="title"/>
-          </p:nvPr>
-        </p:nvSpPr>
-        <p:spPr/>
-        <p:txBody>
-          <a:bodyPr/>
-          <a:lstStyle/>
-          <a:p>
-            <a:r>
-              <a:rPr lang="en-US" dirty="0" smtClean="0"/>
-              <a:t>Mongoose Package</a:t>
-            </a:r>
-            <a:endParaRPr lang="en-US" dirty="0"/>
-          </a:p>
-        </p:txBody>
-      </p:sp>
     </p:spTree>
     <p:extLst>
       <p:ext uri="{BB962C8B-B14F-4D97-AF65-F5344CB8AC3E}">
-        <p14:creationId xmlns:p14="http://schemas.microsoft.com/office/powerpoint/2010/main" val="572400895"/>
+        <p14:creationId xmlns:p14="http://schemas.microsoft.com/office/powerpoint/2010/main" val="2736691654"/>
       </p:ext>
     </p:extLst>
   </p:cSld>
@@ -5025,36 +4966,6 @@
       </p:par>
     </p:tnLst>
   </p:timing>
-</p:sld>
-</file>
-
-<file path=ppt/slides/slide20.xml><?xml version="1.0" encoding="utf-8"?>
-<p:sld xmlns:a="http://schemas.openxmlformats.org/drawingml/2006/main" xmlns:r="http://schemas.openxmlformats.org/officeDocument/2006/relationships" xmlns:p="http://schemas.openxmlformats.org/presentationml/2006/main">
-  <p:cSld>
-    <p:spTree>
-      <p:nvGrpSpPr>
-        <p:cNvPr id="1" name=""/>
-        <p:cNvGrpSpPr/>
-        <p:nvPr/>
-      </p:nvGrpSpPr>
-      <p:grpSpPr>
-        <a:xfrm>
-          <a:off x="0" y="0"/>
-          <a:ext cx="0" cy="0"/>
-          <a:chOff x="0" y="0"/>
-          <a:chExt cx="0" cy="0"/>
-        </a:xfrm>
-      </p:grpSpPr>
-    </p:spTree>
-    <p:extLst>
-      <p:ext uri="{BB962C8B-B14F-4D97-AF65-F5344CB8AC3E}">
-        <p14:creationId xmlns:p14="http://schemas.microsoft.com/office/powerpoint/2010/main" val="2736691654"/>
-      </p:ext>
-    </p:extLst>
-  </p:cSld>
-  <p:clrMapOvr>
-    <a:masterClrMapping/>
-  </p:clrMapOvr>
 </p:sld>
 </file>
 
@@ -5898,7 +5809,7 @@
           <a:noFill/>
           <a:extLst>
             <a:ext uri="{909E8E84-426E-40dd-AFC4-6F175D3DCCD1}">
-              <a14:hiddenFill xmlns:a14="http://schemas.microsoft.com/office/drawing/2010/main" xmlns="">
+              <a14:hiddenFill xmlns="" xmlns:a14="http://schemas.microsoft.com/office/drawing/2010/main">
                 <a:solidFill>
                   <a:srgbClr val="FFFFFF"/>
                 </a:solidFill>
@@ -6762,6 +6673,21 @@
 </file>
 
 <file path=customXml/item1.xml><?xml version="1.0" encoding="utf-8"?>
+<p:properties xmlns:p="http://schemas.microsoft.com/office/2006/metadata/properties" xmlns:xsi="http://www.w3.org/2001/XMLSchema-instance" xmlns:pc="http://schemas.microsoft.com/office/infopath/2007/PartnerControls">
+  <documentManagement/>
+</p:properties>
+</file>
+
+<file path=customXml/item2.xml><?xml version="1.0" encoding="utf-8"?>
+<?mso-contentType ?>
+<FormTemplates xmlns="http://schemas.microsoft.com/sharepoint/v3/contenttype/forms">
+  <Display>DocumentLibraryForm</Display>
+  <Edit>DocumentLibraryForm</Edit>
+  <New>DocumentLibraryForm</New>
+</FormTemplates>
+</file>
+
+<file path=customXml/item3.xml><?xml version="1.0" encoding="utf-8"?>
 <ct:contentTypeSchema xmlns:ct="http://schemas.microsoft.com/office/2006/metadata/contentType" xmlns:ma="http://schemas.microsoft.com/office/2006/metadata/properties/metaAttributes" ct:_="" ma:_="" ma:contentTypeName="Document" ma:contentTypeID="0x010100391E57C78B9F604FB8BAD296D1460E2A" ma:contentTypeVersion="1" ma:contentTypeDescription="Create a new document." ma:contentTypeScope="" ma:versionID="fb382fe2362acd2155f454904f478e4d">
   <xsd:schema xmlns:xsd="http://www.w3.org/2001/XMLSchema" xmlns:xs="http://www.w3.org/2001/XMLSchema" xmlns:p="http://schemas.microsoft.com/office/2006/metadata/properties" xmlns:ns3="636b0322-90fb-440c-9cbc-22749e7231e9" targetNamespace="http://schemas.microsoft.com/office/2006/metadata/properties" ma:root="true" ma:fieldsID="b9887c63ce4710c1aeb75a5f03aecb69" ns3:_="">
     <xsd:import namespace="636b0322-90fb-440c-9cbc-22749e7231e9"/>
@@ -6901,22 +6827,31 @@
 </ct:contentTypeSchema>
 </file>
 
-<file path=customXml/item2.xml><?xml version="1.0" encoding="utf-8"?>
-<?mso-contentType ?>
-<FormTemplates xmlns="http://schemas.microsoft.com/sharepoint/v3/contenttype/forms">
-  <Display>DocumentLibraryForm</Display>
-  <Edit>DocumentLibraryForm</Edit>
-  <New>DocumentLibraryForm</New>
-</FormTemplates>
+<file path=customXml/itemProps1.xml><?xml version="1.0" encoding="utf-8"?>
+<ds:datastoreItem xmlns:ds="http://schemas.openxmlformats.org/officeDocument/2006/customXml" ds:itemID="{7025FDD9-4C58-4084-9F89-0E6ADD6FFF55}">
+  <ds:schemaRefs>
+    <ds:schemaRef ds:uri="http://purl.org/dc/terms/"/>
+    <ds:schemaRef ds:uri="http://schemas.openxmlformats.org/package/2006/metadata/core-properties"/>
+    <ds:schemaRef ds:uri="http://schemas.microsoft.com/office/2006/documentManagement/types"/>
+    <ds:schemaRef ds:uri="http://schemas.microsoft.com/office/infopath/2007/PartnerControls"/>
+    <ds:schemaRef ds:uri="http://purl.org/dc/elements/1.1/"/>
+    <ds:schemaRef ds:uri="http://schemas.microsoft.com/office/2006/metadata/properties"/>
+    <ds:schemaRef ds:uri="636b0322-90fb-440c-9cbc-22749e7231e9"/>
+    <ds:schemaRef ds:uri="http://www.w3.org/XML/1998/namespace"/>
+    <ds:schemaRef ds:uri="http://purl.org/dc/dcmitype/"/>
+  </ds:schemaRefs>
+</ds:datastoreItem>
 </file>
 
-<file path=customXml/item3.xml><?xml version="1.0" encoding="utf-8"?>
-<p:properties xmlns:p="http://schemas.microsoft.com/office/2006/metadata/properties" xmlns:xsi="http://www.w3.org/2001/XMLSchema-instance" xmlns:pc="http://schemas.microsoft.com/office/infopath/2007/PartnerControls">
-  <documentManagement/>
-</p:properties>
+<file path=customXml/itemProps2.xml><?xml version="1.0" encoding="utf-8"?>
+<ds:datastoreItem xmlns:ds="http://schemas.openxmlformats.org/officeDocument/2006/customXml" ds:itemID="{B0CA13EC-1D3C-4D6F-8D1C-E8A452CFC79A}">
+  <ds:schemaRefs>
+    <ds:schemaRef ds:uri="http://schemas.microsoft.com/sharepoint/v3/contenttype/forms"/>
+  </ds:schemaRefs>
+</ds:datastoreItem>
 </file>
 
-<file path=customXml/itemProps1.xml><?xml version="1.0" encoding="utf-8"?>
+<file path=customXml/itemProps3.xml><?xml version="1.0" encoding="utf-8"?>
 <ds:datastoreItem xmlns:ds="http://schemas.openxmlformats.org/officeDocument/2006/customXml" ds:itemID="{7B70CE0C-0988-423A-BF66-B40F6A1061FF}">
   <ds:schemaRefs>
     <ds:schemaRef ds:uri="http://schemas.microsoft.com/office/2006/metadata/contentType"/>
@@ -6932,28 +6867,4 @@
     <ds:schemaRef ds:uri="http://schemas.microsoft.com/internal/obd"/>
   </ds:schemaRefs>
 </ds:datastoreItem>
-</file>
-
-<file path=customXml/itemProps2.xml><?xml version="1.0" encoding="utf-8"?>
-<ds:datastoreItem xmlns:ds="http://schemas.openxmlformats.org/officeDocument/2006/customXml" ds:itemID="{B0CA13EC-1D3C-4D6F-8D1C-E8A452CFC79A}">
-  <ds:schemaRefs>
-    <ds:schemaRef ds:uri="http://schemas.microsoft.com/sharepoint/v3/contenttype/forms"/>
-  </ds:schemaRefs>
-</ds:datastoreItem>
-</file>
-
-<file path=customXml/itemProps3.xml><?xml version="1.0" encoding="utf-8"?>
-<ds:datastoreItem xmlns:ds="http://schemas.openxmlformats.org/officeDocument/2006/customXml" ds:itemID="{7025FDD9-4C58-4084-9F89-0E6ADD6FFF55}">
-  <ds:schemaRefs>
-    <ds:schemaRef ds:uri="http://purl.org/dc/terms/"/>
-    <ds:schemaRef ds:uri="http://schemas.openxmlformats.org/package/2006/metadata/core-properties"/>
-    <ds:schemaRef ds:uri="http://schemas.microsoft.com/office/2006/documentManagement/types"/>
-    <ds:schemaRef ds:uri="http://schemas.microsoft.com/office/infopath/2007/PartnerControls"/>
-    <ds:schemaRef ds:uri="http://purl.org/dc/elements/1.1/"/>
-    <ds:schemaRef ds:uri="http://schemas.microsoft.com/office/2006/metadata/properties"/>
-    <ds:schemaRef ds:uri="636b0322-90fb-440c-9cbc-22749e7231e9"/>
-    <ds:schemaRef ds:uri="http://www.w3.org/XML/1998/namespace"/>
-    <ds:schemaRef ds:uri="http://purl.org/dc/dcmitype/"/>
-  </ds:schemaRefs>
-</ds:datastoreItem>
 </file>
</xml_diff>